<commit_message>
update doi link to example project
</commit_message>
<xml_diff>
--- a/efficient_microdata.pptx
+++ b/efficient_microdata.pptx
@@ -480,7 +480,7 @@
             <a:fld id="{5E4F288A-A6E3-41AC-A051-0411F84CEBE4}" type="datetime1">
               <a:rPr lang="en-GB"/>
               <a:pPr lvl="0"/>
-              <a:t>13/04/2024</a:t>
+              <a:t>15/04/2024</a:t>
             </a:fld>
             <a:endParaRPr lang="en-GB"/>
           </a:p>
@@ -994,7 +994,7 @@
             <a:fld id="{40D0F563-FC19-4F32-AEF6-1F1DD9A26D94}" type="datetime1">
               <a:rPr lang="en-GB"/>
               <a:pPr lvl="0"/>
-              <a:t>13/04/2024</a:t>
+              <a:t>15/04/2024</a:t>
             </a:fld>
             <a:endParaRPr lang="en-GB"/>
           </a:p>
@@ -1231,7 +1231,7 @@
             <a:fld id="{57CE4236-54B9-48EA-85DF-EAA8081FF5D6}" type="datetime1">
               <a:rPr lang="en-GB"/>
               <a:pPr lvl="0"/>
-              <a:t>13/04/2024</a:t>
+              <a:t>15/04/2024</a:t>
             </a:fld>
             <a:endParaRPr lang="en-GB"/>
           </a:p>
@@ -1477,7 +1477,7 @@
             <a:fld id="{1B804053-0255-486B-B0F0-0F7C86CBDEA7}" type="datetime1">
               <a:rPr lang="en-GB"/>
               <a:pPr lvl="0"/>
-              <a:t>13/04/2024</a:t>
+              <a:t>15/04/2024</a:t>
             </a:fld>
             <a:endParaRPr lang="en-GB"/>
           </a:p>
@@ -1713,7 +1713,7 @@
             <a:fld id="{F3827D9B-3E0E-449F-A946-F3491C9D9D39}" type="datetime1">
               <a:rPr lang="en-GB"/>
               <a:pPr lvl="0"/>
-              <a:t>13/04/2024</a:t>
+              <a:t>15/04/2024</a:t>
             </a:fld>
             <a:endParaRPr lang="en-GB"/>
           </a:p>
@@ -1924,7 +1924,7 @@
             <a:fld id="{53090247-1E8C-48C1-BE5B-ABCCB499B70C}" type="datetime1">
               <a:rPr lang="en-GB"/>
               <a:pPr lvl="0"/>
-              <a:t>13/04/2024</a:t>
+              <a:t>15/04/2024</a:t>
             </a:fld>
             <a:endParaRPr lang="en-GB"/>
           </a:p>
@@ -2244,7 +2244,7 @@
             <a:fld id="{794AA38E-6FCB-4E34-8FE1-E06FC6B697D9}" type="datetime1">
               <a:rPr lang="en-GB"/>
               <a:pPr lvl="0"/>
-              <a:t>13/04/2024</a:t>
+              <a:t>15/04/2024</a:t>
             </a:fld>
             <a:endParaRPr lang="en-GB"/>
           </a:p>
@@ -2647,7 +2647,7 @@
             <a:fld id="{497E95C5-7C0A-4000-8B07-961C7F40DA0C}" type="datetime1">
               <a:rPr lang="en-GB"/>
               <a:pPr lvl="0"/>
-              <a:t>13/04/2024</a:t>
+              <a:t>15/04/2024</a:t>
             </a:fld>
             <a:endParaRPr lang="en-GB"/>
           </a:p>
@@ -2809,7 +2809,7 @@
             <a:fld id="{78062716-05BE-4E55-B717-8165588D1704}" type="datetime1">
               <a:rPr lang="en-GB"/>
               <a:pPr lvl="0"/>
-              <a:t>13/04/2024</a:t>
+              <a:t>15/04/2024</a:t>
             </a:fld>
             <a:endParaRPr lang="en-GB"/>
           </a:p>
@@ -2937,7 +2937,7 @@
             <a:fld id="{76FEE43E-2081-4B11-8B65-A62818AD16FA}" type="datetime1">
               <a:rPr lang="en-GB"/>
               <a:pPr lvl="0"/>
-              <a:t>13/04/2024</a:t>
+              <a:t>15/04/2024</a:t>
             </a:fld>
             <a:endParaRPr lang="en-GB"/>
           </a:p>
@@ -3222,7 +3222,7 @@
             <a:fld id="{D8A3DB83-8C32-40B1-97E8-FB35626DF478}" type="datetime1">
               <a:rPr lang="en-GB"/>
               <a:pPr lvl="0"/>
-              <a:t>13/04/2024</a:t>
+              <a:t>15/04/2024</a:t>
             </a:fld>
             <a:endParaRPr lang="en-GB"/>
           </a:p>
@@ -3464,7 +3464,7 @@
             <a:fld id="{38EE5B45-DD4E-4843-9F3A-14E4993B12CA}" type="datetime1">
               <a:rPr lang="en-GB"/>
               <a:pPr lvl="0"/>
-              <a:t>13/04/2024</a:t>
+              <a:t>15/04/2024</a:t>
             </a:fld>
             <a:endParaRPr lang="en-GB"/>
           </a:p>
@@ -3747,7 +3747,7 @@
             <a:fld id="{E91A6515-C8A5-4C9E-86DC-9D0D6CBE66E8}" type="datetime1">
               <a:rPr lang="en-GB"/>
               <a:pPr lvl="0"/>
-              <a:t>13/04/2024</a:t>
+              <a:t>15/04/2024</a:t>
             </a:fld>
             <a:endParaRPr lang="en-GB"/>
           </a:p>
@@ -9907,7 +9907,7 @@
       <p:pic>
         <p:nvPicPr>
           <p:cNvPr id="5" name="Graphic 4">
-            <a:hlinkClick r:id="rId2" action="ppaction://hlinkfile"/>
+            <a:hlinkClick r:id="rId2"/>
             <a:extLst>
               <a:ext uri="{FF2B5EF4-FFF2-40B4-BE49-F238E27FC236}">
                 <a16:creationId xmlns:a16="http://schemas.microsoft.com/office/drawing/2014/main" id="{5559BE94-2E84-4C5E-CFBC-E7DE6D94415C}"/>

</xml_diff>